<commit_message>
Tweaked the new figure in e/m lab
</commit_message>
<xml_diff>
--- a/StudentGuideModule2/eoverm/aligning_beam_and_reflection.pptx
+++ b/StudentGuideModule2/eoverm/aligning_beam_and_reflection.pptx
@@ -197,7 +197,7 @@
           <a:p>
             <a:fld id="{2B90F60C-615B-447C-82B8-C8001B127D70}" type="datetimeFigureOut">
               <a:rPr lang="en-US" smtClean="0"/>
-              <a:t>11/30/2017</a:t>
+              <a:t>12/3/2017</a:t>
             </a:fld>
             <a:endParaRPr lang="en-US"/>
           </a:p>
@@ -680,7 +680,7 @@
           <a:p>
             <a:fld id="{24D24DFE-C982-4093-8F8B-71E1A35C7976}" type="datetimeFigureOut">
               <a:rPr lang="en-US" smtClean="0"/>
-              <a:t>11/30/2017</a:t>
+              <a:t>12/3/2017</a:t>
             </a:fld>
             <a:endParaRPr lang="en-US"/>
           </a:p>
@@ -850,7 +850,7 @@
           <a:p>
             <a:fld id="{24D24DFE-C982-4093-8F8B-71E1A35C7976}" type="datetimeFigureOut">
               <a:rPr lang="en-US" smtClean="0"/>
-              <a:t>11/30/2017</a:t>
+              <a:t>12/3/2017</a:t>
             </a:fld>
             <a:endParaRPr lang="en-US"/>
           </a:p>
@@ -1030,7 +1030,7 @@
           <a:p>
             <a:fld id="{24D24DFE-C982-4093-8F8B-71E1A35C7976}" type="datetimeFigureOut">
               <a:rPr lang="en-US" smtClean="0"/>
-              <a:t>11/30/2017</a:t>
+              <a:t>12/3/2017</a:t>
             </a:fld>
             <a:endParaRPr lang="en-US"/>
           </a:p>
@@ -1200,7 +1200,7 @@
           <a:p>
             <a:fld id="{24D24DFE-C982-4093-8F8B-71E1A35C7976}" type="datetimeFigureOut">
               <a:rPr lang="en-US" smtClean="0"/>
-              <a:t>11/30/2017</a:t>
+              <a:t>12/3/2017</a:t>
             </a:fld>
             <a:endParaRPr lang="en-US"/>
           </a:p>
@@ -1446,7 +1446,7 @@
           <a:p>
             <a:fld id="{24D24DFE-C982-4093-8F8B-71E1A35C7976}" type="datetimeFigureOut">
               <a:rPr lang="en-US" smtClean="0"/>
-              <a:t>11/30/2017</a:t>
+              <a:t>12/3/2017</a:t>
             </a:fld>
             <a:endParaRPr lang="en-US"/>
           </a:p>
@@ -1678,7 +1678,7 @@
           <a:p>
             <a:fld id="{24D24DFE-C982-4093-8F8B-71E1A35C7976}" type="datetimeFigureOut">
               <a:rPr lang="en-US" smtClean="0"/>
-              <a:t>11/30/2017</a:t>
+              <a:t>12/3/2017</a:t>
             </a:fld>
             <a:endParaRPr lang="en-US"/>
           </a:p>
@@ -2045,7 +2045,7 @@
           <a:p>
             <a:fld id="{24D24DFE-C982-4093-8F8B-71E1A35C7976}" type="datetimeFigureOut">
               <a:rPr lang="en-US" smtClean="0"/>
-              <a:t>11/30/2017</a:t>
+              <a:t>12/3/2017</a:t>
             </a:fld>
             <a:endParaRPr lang="en-US"/>
           </a:p>
@@ -2163,7 +2163,7 @@
           <a:p>
             <a:fld id="{24D24DFE-C982-4093-8F8B-71E1A35C7976}" type="datetimeFigureOut">
               <a:rPr lang="en-US" smtClean="0"/>
-              <a:t>11/30/2017</a:t>
+              <a:t>12/3/2017</a:t>
             </a:fld>
             <a:endParaRPr lang="en-US"/>
           </a:p>
@@ -2258,7 +2258,7 @@
           <a:p>
             <a:fld id="{24D24DFE-C982-4093-8F8B-71E1A35C7976}" type="datetimeFigureOut">
               <a:rPr lang="en-US" smtClean="0"/>
-              <a:t>11/30/2017</a:t>
+              <a:t>12/3/2017</a:t>
             </a:fld>
             <a:endParaRPr lang="en-US"/>
           </a:p>
@@ -2535,7 +2535,7 @@
           <a:p>
             <a:fld id="{24D24DFE-C982-4093-8F8B-71E1A35C7976}" type="datetimeFigureOut">
               <a:rPr lang="en-US" smtClean="0"/>
-              <a:t>11/30/2017</a:t>
+              <a:t>12/3/2017</a:t>
             </a:fld>
             <a:endParaRPr lang="en-US"/>
           </a:p>
@@ -2788,7 +2788,7 @@
           <a:p>
             <a:fld id="{24D24DFE-C982-4093-8F8B-71E1A35C7976}" type="datetimeFigureOut">
               <a:rPr lang="en-US" smtClean="0"/>
-              <a:t>11/30/2017</a:t>
+              <a:t>12/3/2017</a:t>
             </a:fld>
             <a:endParaRPr lang="en-US"/>
           </a:p>
@@ -3001,7 +3001,7 @@
           <a:p>
             <a:fld id="{24D24DFE-C982-4093-8F8B-71E1A35C7976}" type="datetimeFigureOut">
               <a:rPr lang="en-US" smtClean="0"/>
-              <a:t>11/30/2017</a:t>
+              <a:t>12/3/2017</a:t>
             </a:fld>
             <a:endParaRPr lang="en-US"/>
           </a:p>
@@ -3408,66 +3408,6 @@
       </p:grpSpPr>
       <p:sp>
         <p:nvSpPr>
-          <p:cNvPr id="5" name="Donut 4"/>
-          <p:cNvSpPr/>
-          <p:nvPr/>
-        </p:nvSpPr>
-        <p:spPr>
-          <a:xfrm>
-            <a:off x="1290320" y="2287693"/>
-            <a:ext cx="1791547" cy="1791547"/>
-          </a:xfrm>
-          <a:prstGeom prst="donut">
-            <a:avLst>
-              <a:gd name="adj" fmla="val 2088"/>
-            </a:avLst>
-          </a:prstGeom>
-          <a:solidFill>
-            <a:srgbClr val="C7C7C7"/>
-          </a:solidFill>
-          <a:ln>
-            <a:noFill/>
-          </a:ln>
-          <a:effectLst>
-            <a:glow rad="101600">
-              <a:schemeClr val="bg1">
-                <a:lumMod val="65000"/>
-                <a:alpha val="60000"/>
-              </a:schemeClr>
-            </a:glow>
-          </a:effectLst>
-        </p:spPr>
-        <p:style>
-          <a:lnRef idx="2">
-            <a:schemeClr val="accent1">
-              <a:shade val="50000"/>
-            </a:schemeClr>
-          </a:lnRef>
-          <a:fillRef idx="1">
-            <a:schemeClr val="accent1"/>
-          </a:fillRef>
-          <a:effectRef idx="0">
-            <a:schemeClr val="accent1"/>
-          </a:effectRef>
-          <a:fontRef idx="minor">
-            <a:schemeClr val="lt1"/>
-          </a:fontRef>
-        </p:style>
-        <p:txBody>
-          <a:bodyPr rtlCol="0" anchor="ctr"/>
-          <a:lstStyle/>
-          <a:p>
-            <a:pPr algn="ctr"/>
-            <a:endParaRPr lang="en-US">
-              <a:solidFill>
-                <a:schemeClr val="tx1"/>
-              </a:solidFill>
-            </a:endParaRPr>
-          </a:p>
-        </p:txBody>
-      </p:sp>
-      <p:sp>
-        <p:nvSpPr>
           <p:cNvPr id="4" name="Donut 3"/>
           <p:cNvSpPr/>
           <p:nvPr/>
@@ -3528,6 +3468,66 @@
           </a:p>
         </p:txBody>
       </p:sp>
+      <p:sp>
+        <p:nvSpPr>
+          <p:cNvPr id="5" name="Donut 4"/>
+          <p:cNvSpPr/>
+          <p:nvPr/>
+        </p:nvSpPr>
+        <p:spPr>
+          <a:xfrm>
+            <a:off x="1290320" y="2287693"/>
+            <a:ext cx="1791547" cy="1791547"/>
+          </a:xfrm>
+          <a:prstGeom prst="donut">
+            <a:avLst>
+              <a:gd name="adj" fmla="val 319"/>
+            </a:avLst>
+          </a:prstGeom>
+          <a:solidFill>
+            <a:srgbClr val="C7C7C7"/>
+          </a:solidFill>
+          <a:ln>
+            <a:noFill/>
+          </a:ln>
+          <a:effectLst>
+            <a:glow rad="101600">
+              <a:schemeClr val="bg1">
+                <a:lumMod val="65000"/>
+                <a:alpha val="60000"/>
+              </a:schemeClr>
+            </a:glow>
+          </a:effectLst>
+        </p:spPr>
+        <p:style>
+          <a:lnRef idx="2">
+            <a:schemeClr val="accent1">
+              <a:shade val="50000"/>
+            </a:schemeClr>
+          </a:lnRef>
+          <a:fillRef idx="1">
+            <a:schemeClr val="accent1"/>
+          </a:fillRef>
+          <a:effectRef idx="0">
+            <a:schemeClr val="accent1"/>
+          </a:effectRef>
+          <a:fontRef idx="minor">
+            <a:schemeClr val="lt1"/>
+          </a:fontRef>
+        </p:style>
+        <p:txBody>
+          <a:bodyPr rtlCol="0" anchor="ctr"/>
+          <a:lstStyle/>
+          <a:p>
+            <a:pPr algn="ctr"/>
+            <a:endParaRPr lang="en-US">
+              <a:solidFill>
+                <a:schemeClr val="tx1"/>
+              </a:solidFill>
+            </a:endParaRPr>
+          </a:p>
+        </p:txBody>
+      </p:sp>
       <p:grpSp>
         <p:nvGrpSpPr>
           <p:cNvPr id="46" name="Group 45"/>
@@ -5938,6 +5938,136 @@
           </a:p>
         </p:txBody>
       </p:sp>
+      <p:sp>
+        <p:nvSpPr>
+          <p:cNvPr id="86" name="TextBox 85"/>
+          <p:cNvSpPr txBox="1"/>
+          <p:nvPr/>
+        </p:nvSpPr>
+        <p:spPr>
+          <a:xfrm>
+            <a:off x="1158240" y="3927362"/>
+            <a:ext cx="659686" cy="253916"/>
+          </a:xfrm>
+          <a:prstGeom prst="rect">
+            <a:avLst/>
+          </a:prstGeom>
+          <a:noFill/>
+        </p:spPr>
+        <p:txBody>
+          <a:bodyPr wrap="square" rtlCol="0">
+            <a:spAutoFit/>
+          </a:bodyPr>
+          <a:lstStyle/>
+          <a:p>
+            <a:r>
+              <a:rPr lang="en-US" sz="1050" dirty="0" smtClean="0"/>
+              <a:t>beam</a:t>
+            </a:r>
+            <a:endParaRPr lang="en-US" sz="1050" dirty="0"/>
+          </a:p>
+        </p:txBody>
+      </p:sp>
+      <p:sp>
+        <p:nvSpPr>
+          <p:cNvPr id="87" name="TextBox 86"/>
+          <p:cNvSpPr txBox="1"/>
+          <p:nvPr/>
+        </p:nvSpPr>
+        <p:spPr>
+          <a:xfrm>
+            <a:off x="1905525" y="3531845"/>
+            <a:ext cx="793036" cy="253916"/>
+          </a:xfrm>
+          <a:prstGeom prst="rect">
+            <a:avLst/>
+          </a:prstGeom>
+          <a:noFill/>
+        </p:spPr>
+        <p:txBody>
+          <a:bodyPr wrap="square" rtlCol="0">
+            <a:spAutoFit/>
+          </a:bodyPr>
+          <a:lstStyle/>
+          <a:p>
+            <a:r>
+              <a:rPr lang="en-US" sz="1050" dirty="0" smtClean="0"/>
+              <a:t>reflection</a:t>
+            </a:r>
+            <a:endParaRPr lang="en-US" sz="1050" dirty="0"/>
+          </a:p>
+        </p:txBody>
+      </p:sp>
+      <p:cxnSp>
+        <p:nvCxnSpPr>
+          <p:cNvPr id="15" name="Straight Connector 14"/>
+          <p:cNvCxnSpPr/>
+          <p:nvPr/>
+        </p:nvCxnSpPr>
+        <p:spPr>
+          <a:xfrm flipV="1">
+            <a:off x="1488083" y="3775710"/>
+            <a:ext cx="19971" cy="204992"/>
+          </a:xfrm>
+          <a:prstGeom prst="line">
+            <a:avLst/>
+          </a:prstGeom>
+          <a:ln>
+            <a:solidFill>
+              <a:schemeClr val="tx1"/>
+            </a:solidFill>
+          </a:ln>
+        </p:spPr>
+        <p:style>
+          <a:lnRef idx="1">
+            <a:schemeClr val="accent1"/>
+          </a:lnRef>
+          <a:fillRef idx="0">
+            <a:schemeClr val="accent1"/>
+          </a:fillRef>
+          <a:effectRef idx="0">
+            <a:schemeClr val="accent1"/>
+          </a:effectRef>
+          <a:fontRef idx="minor">
+            <a:schemeClr val="tx1"/>
+          </a:fontRef>
+        </p:style>
+      </p:cxnSp>
+      <p:cxnSp>
+        <p:nvCxnSpPr>
+          <p:cNvPr id="88" name="Straight Connector 87"/>
+          <p:cNvCxnSpPr/>
+          <p:nvPr/>
+        </p:nvCxnSpPr>
+        <p:spPr>
+          <a:xfrm flipV="1">
+            <a:off x="1765609" y="3670233"/>
+            <a:ext cx="193256" cy="19465"/>
+          </a:xfrm>
+          <a:prstGeom prst="line">
+            <a:avLst/>
+          </a:prstGeom>
+          <a:ln>
+            <a:solidFill>
+              <a:schemeClr val="tx1"/>
+            </a:solidFill>
+          </a:ln>
+        </p:spPr>
+        <p:style>
+          <a:lnRef idx="1">
+            <a:schemeClr val="accent1"/>
+          </a:lnRef>
+          <a:fillRef idx="0">
+            <a:schemeClr val="accent1"/>
+          </a:fillRef>
+          <a:effectRef idx="0">
+            <a:schemeClr val="accent1"/>
+          </a:effectRef>
+          <a:fontRef idx="minor">
+            <a:schemeClr val="tx1"/>
+          </a:fontRef>
+        </p:style>
+      </p:cxnSp>
     </p:spTree>
     <p:extLst>
       <p:ext uri="{BB962C8B-B14F-4D97-AF65-F5344CB8AC3E}">

</xml_diff>

<commit_message>
Changes to e/m lab
I folded material from the old Activity 3 into Activity 1, so that all of the parts pertaining to directions of vectors are grouped together.  I rewrote that hole part with more specific figures, so that students can rely on the right hand rule without needing to specify directions of i, j, and k-hat vectors.  Besides this, I made minor changes to wording, numbering of parts, and formatting.
</commit_message>
<xml_diff>
--- a/StudentGuideModule2/eoverm/aligning_beam_and_reflection.pptx
+++ b/StudentGuideModule2/eoverm/aligning_beam_and_reflection.pptx
@@ -197,7 +197,7 @@
           <a:p>
             <a:fld id="{2B90F60C-615B-447C-82B8-C8001B127D70}" type="datetimeFigureOut">
               <a:rPr lang="en-US" smtClean="0"/>
-              <a:t>12/3/2017</a:t>
+              <a:t>8/1/2020</a:t>
             </a:fld>
             <a:endParaRPr lang="en-US"/>
           </a:p>
@@ -680,7 +680,7 @@
           <a:p>
             <a:fld id="{24D24DFE-C982-4093-8F8B-71E1A35C7976}" type="datetimeFigureOut">
               <a:rPr lang="en-US" smtClean="0"/>
-              <a:t>12/3/2017</a:t>
+              <a:t>8/1/2020</a:t>
             </a:fld>
             <a:endParaRPr lang="en-US"/>
           </a:p>
@@ -850,7 +850,7 @@
           <a:p>
             <a:fld id="{24D24DFE-C982-4093-8F8B-71E1A35C7976}" type="datetimeFigureOut">
               <a:rPr lang="en-US" smtClean="0"/>
-              <a:t>12/3/2017</a:t>
+              <a:t>8/1/2020</a:t>
             </a:fld>
             <a:endParaRPr lang="en-US"/>
           </a:p>
@@ -1030,7 +1030,7 @@
           <a:p>
             <a:fld id="{24D24DFE-C982-4093-8F8B-71E1A35C7976}" type="datetimeFigureOut">
               <a:rPr lang="en-US" smtClean="0"/>
-              <a:t>12/3/2017</a:t>
+              <a:t>8/1/2020</a:t>
             </a:fld>
             <a:endParaRPr lang="en-US"/>
           </a:p>
@@ -1200,7 +1200,7 @@
           <a:p>
             <a:fld id="{24D24DFE-C982-4093-8F8B-71E1A35C7976}" type="datetimeFigureOut">
               <a:rPr lang="en-US" smtClean="0"/>
-              <a:t>12/3/2017</a:t>
+              <a:t>8/1/2020</a:t>
             </a:fld>
             <a:endParaRPr lang="en-US"/>
           </a:p>
@@ -1446,7 +1446,7 @@
           <a:p>
             <a:fld id="{24D24DFE-C982-4093-8F8B-71E1A35C7976}" type="datetimeFigureOut">
               <a:rPr lang="en-US" smtClean="0"/>
-              <a:t>12/3/2017</a:t>
+              <a:t>8/1/2020</a:t>
             </a:fld>
             <a:endParaRPr lang="en-US"/>
           </a:p>
@@ -1678,7 +1678,7 @@
           <a:p>
             <a:fld id="{24D24DFE-C982-4093-8F8B-71E1A35C7976}" type="datetimeFigureOut">
               <a:rPr lang="en-US" smtClean="0"/>
-              <a:t>12/3/2017</a:t>
+              <a:t>8/1/2020</a:t>
             </a:fld>
             <a:endParaRPr lang="en-US"/>
           </a:p>
@@ -2045,7 +2045,7 @@
           <a:p>
             <a:fld id="{24D24DFE-C982-4093-8F8B-71E1A35C7976}" type="datetimeFigureOut">
               <a:rPr lang="en-US" smtClean="0"/>
-              <a:t>12/3/2017</a:t>
+              <a:t>8/1/2020</a:t>
             </a:fld>
             <a:endParaRPr lang="en-US"/>
           </a:p>
@@ -2163,7 +2163,7 @@
           <a:p>
             <a:fld id="{24D24DFE-C982-4093-8F8B-71E1A35C7976}" type="datetimeFigureOut">
               <a:rPr lang="en-US" smtClean="0"/>
-              <a:t>12/3/2017</a:t>
+              <a:t>8/1/2020</a:t>
             </a:fld>
             <a:endParaRPr lang="en-US"/>
           </a:p>
@@ -2258,7 +2258,7 @@
           <a:p>
             <a:fld id="{24D24DFE-C982-4093-8F8B-71E1A35C7976}" type="datetimeFigureOut">
               <a:rPr lang="en-US" smtClean="0"/>
-              <a:t>12/3/2017</a:t>
+              <a:t>8/1/2020</a:t>
             </a:fld>
             <a:endParaRPr lang="en-US"/>
           </a:p>
@@ -2535,7 +2535,7 @@
           <a:p>
             <a:fld id="{24D24DFE-C982-4093-8F8B-71E1A35C7976}" type="datetimeFigureOut">
               <a:rPr lang="en-US" smtClean="0"/>
-              <a:t>12/3/2017</a:t>
+              <a:t>8/1/2020</a:t>
             </a:fld>
             <a:endParaRPr lang="en-US"/>
           </a:p>
@@ -2788,7 +2788,7 @@
           <a:p>
             <a:fld id="{24D24DFE-C982-4093-8F8B-71E1A35C7976}" type="datetimeFigureOut">
               <a:rPr lang="en-US" smtClean="0"/>
-              <a:t>12/3/2017</a:t>
+              <a:t>8/1/2020</a:t>
             </a:fld>
             <a:endParaRPr lang="en-US"/>
           </a:p>
@@ -3001,7 +3001,7 @@
           <a:p>
             <a:fld id="{24D24DFE-C982-4093-8F8B-71E1A35C7976}" type="datetimeFigureOut">
               <a:rPr lang="en-US" smtClean="0"/>
-              <a:t>12/3/2017</a:t>
+              <a:t>8/1/2020</a:t>
             </a:fld>
             <a:endParaRPr lang="en-US"/>
           </a:p>
@@ -3424,7 +3424,7 @@
           </a:prstGeom>
           <a:solidFill>
             <a:schemeClr val="bg1">
-              <a:lumMod val="75000"/>
+              <a:lumMod val="85000"/>
             </a:schemeClr>
           </a:solidFill>
           <a:ln>
@@ -3433,7 +3433,7 @@
           <a:effectLst>
             <a:glow rad="101600">
               <a:schemeClr val="bg1">
-                <a:lumMod val="65000"/>
+                <a:lumMod val="75000"/>
                 <a:alpha val="60000"/>
               </a:schemeClr>
             </a:glow>
@@ -3536,7 +3536,7 @@
         </p:nvGrpSpPr>
         <p:grpSpPr>
           <a:xfrm>
-            <a:off x="1286321" y="3039956"/>
+            <a:off x="1301561" y="3039956"/>
             <a:ext cx="982957" cy="307340"/>
             <a:chOff x="4003040" y="3018155"/>
             <a:chExt cx="1143000" cy="307340"/>
@@ -4636,7 +4636,7 @@
         </p:nvGrpSpPr>
         <p:grpSpPr>
           <a:xfrm>
-            <a:off x="2269278" y="3039956"/>
+            <a:off x="2284518" y="3039956"/>
             <a:ext cx="982957" cy="307340"/>
             <a:chOff x="4003040" y="3018155"/>
             <a:chExt cx="1143000" cy="307340"/>
@@ -5736,7 +5736,7 @@
         </p:nvSpPr>
         <p:spPr>
           <a:xfrm>
-            <a:off x="2473218" y="3304046"/>
+            <a:off x="2488458" y="3304046"/>
             <a:ext cx="227172" cy="261610"/>
           </a:xfrm>
           <a:prstGeom prst="rect">
@@ -5766,7 +5766,7 @@
         </p:nvSpPr>
         <p:spPr>
           <a:xfrm>
-            <a:off x="2801963" y="3304046"/>
+            <a:off x="2817203" y="3304046"/>
             <a:ext cx="227172" cy="261610"/>
           </a:xfrm>
           <a:prstGeom prst="rect">
@@ -5796,7 +5796,7 @@
         </p:nvSpPr>
         <p:spPr>
           <a:xfrm>
-            <a:off x="3130708" y="3304046"/>
+            <a:off x="3145948" y="3304046"/>
             <a:ext cx="227172" cy="261610"/>
           </a:xfrm>
           <a:prstGeom prst="rect">
@@ -5826,7 +5826,7 @@
         </p:nvSpPr>
         <p:spPr>
           <a:xfrm>
-            <a:off x="2144474" y="3304046"/>
+            <a:off x="2159714" y="3304046"/>
             <a:ext cx="227172" cy="261610"/>
           </a:xfrm>
           <a:prstGeom prst="rect">
@@ -5856,7 +5856,7 @@
         </p:nvSpPr>
         <p:spPr>
           <a:xfrm>
-            <a:off x="1815729" y="3304046"/>
+            <a:off x="1830969" y="3304046"/>
             <a:ext cx="227172" cy="261610"/>
           </a:xfrm>
           <a:prstGeom prst="rect">
@@ -5886,7 +5886,7 @@
         </p:nvSpPr>
         <p:spPr>
           <a:xfrm>
-            <a:off x="1486985" y="3304046"/>
+            <a:off x="1502225" y="3304046"/>
             <a:ext cx="227172" cy="261610"/>
           </a:xfrm>
           <a:prstGeom prst="rect">
@@ -5916,7 +5916,7 @@
         </p:nvSpPr>
         <p:spPr>
           <a:xfrm>
-            <a:off x="1158240" y="3304046"/>
+            <a:off x="1173480" y="3304046"/>
             <a:ext cx="227172" cy="261610"/>
           </a:xfrm>
           <a:prstGeom prst="rect">
@@ -6051,6 +6051,184 @@
             <a:solidFill>
               <a:schemeClr val="tx1"/>
             </a:solidFill>
+          </a:ln>
+        </p:spPr>
+        <p:style>
+          <a:lnRef idx="1">
+            <a:schemeClr val="accent1"/>
+          </a:lnRef>
+          <a:fillRef idx="0">
+            <a:schemeClr val="accent1"/>
+          </a:fillRef>
+          <a:effectRef idx="0">
+            <a:schemeClr val="accent1"/>
+          </a:effectRef>
+          <a:fontRef idx="minor">
+            <a:schemeClr val="tx1"/>
+          </a:fontRef>
+        </p:style>
+      </p:cxnSp>
+      <p:sp>
+        <p:nvSpPr>
+          <p:cNvPr id="89" name="TextBox 88"/>
+          <p:cNvSpPr txBox="1"/>
+          <p:nvPr/>
+        </p:nvSpPr>
+        <p:spPr>
+          <a:xfrm>
+            <a:off x="2891817" y="2296877"/>
+            <a:ext cx="982455" cy="415498"/>
+          </a:xfrm>
+          <a:prstGeom prst="rect">
+            <a:avLst/>
+          </a:prstGeom>
+          <a:noFill/>
+        </p:spPr>
+        <p:txBody>
+          <a:bodyPr wrap="square" rtlCol="0">
+            <a:spAutoFit/>
+          </a:bodyPr>
+          <a:lstStyle/>
+          <a:p>
+            <a:r>
+              <a:rPr lang="en-US" sz="1050" dirty="0" smtClean="0"/>
+              <a:t>align beam and reflection</a:t>
+            </a:r>
+            <a:endParaRPr lang="en-US" sz="1050" dirty="0"/>
+          </a:p>
+        </p:txBody>
+      </p:sp>
+      <p:cxnSp>
+        <p:nvCxnSpPr>
+          <p:cNvPr id="90" name="Straight Connector 89"/>
+          <p:cNvCxnSpPr/>
+          <p:nvPr/>
+        </p:nvCxnSpPr>
+        <p:spPr>
+          <a:xfrm flipV="1">
+            <a:off x="3066066" y="2690859"/>
+            <a:ext cx="81663" cy="240168"/>
+          </a:xfrm>
+          <a:prstGeom prst="line">
+            <a:avLst/>
+          </a:prstGeom>
+          <a:ln>
+            <a:solidFill>
+              <a:schemeClr val="tx1"/>
+            </a:solidFill>
+          </a:ln>
+        </p:spPr>
+        <p:style>
+          <a:lnRef idx="1">
+            <a:schemeClr val="accent1"/>
+          </a:lnRef>
+          <a:fillRef idx="0">
+            <a:schemeClr val="accent1"/>
+          </a:fillRef>
+          <a:effectRef idx="0">
+            <a:schemeClr val="accent1"/>
+          </a:effectRef>
+          <a:fontRef idx="minor">
+            <a:schemeClr val="tx1"/>
+          </a:fontRef>
+        </p:style>
+      </p:cxnSp>
+      <p:sp>
+        <p:nvSpPr>
+          <p:cNvPr id="36" name="Right Brace 35"/>
+          <p:cNvSpPr/>
+          <p:nvPr/>
+        </p:nvSpPr>
+        <p:spPr>
+          <a:xfrm rot="16200000">
+            <a:off x="3042956" y="2883892"/>
+            <a:ext cx="45719" cy="163827"/>
+          </a:xfrm>
+          <a:prstGeom prst="rightBrace">
+            <a:avLst>
+              <a:gd name="adj1" fmla="val 41145"/>
+              <a:gd name="adj2" fmla="val 50000"/>
+            </a:avLst>
+          </a:prstGeom>
+          <a:ln w="9525">
+            <a:solidFill>
+              <a:schemeClr val="tx1"/>
+            </a:solidFill>
+            <a:bevel/>
+          </a:ln>
+        </p:spPr>
+        <p:style>
+          <a:lnRef idx="1">
+            <a:schemeClr val="accent1"/>
+          </a:lnRef>
+          <a:fillRef idx="0">
+            <a:schemeClr val="accent1"/>
+          </a:fillRef>
+          <a:effectRef idx="0">
+            <a:schemeClr val="accent1"/>
+          </a:effectRef>
+          <a:fontRef idx="minor">
+            <a:schemeClr val="tx1"/>
+          </a:fontRef>
+        </p:style>
+        <p:txBody>
+          <a:bodyPr rtlCol="0" anchor="ctr"/>
+          <a:lstStyle/>
+          <a:p>
+            <a:pPr algn="ctr"/>
+            <a:endParaRPr lang="en-US"/>
+          </a:p>
+        </p:txBody>
+      </p:sp>
+      <p:sp>
+        <p:nvSpPr>
+          <p:cNvPr id="91" name="TextBox 90"/>
+          <p:cNvSpPr txBox="1"/>
+          <p:nvPr/>
+        </p:nvSpPr>
+        <p:spPr>
+          <a:xfrm>
+            <a:off x="2838477" y="3677565"/>
+            <a:ext cx="906753" cy="415498"/>
+          </a:xfrm>
+          <a:prstGeom prst="rect">
+            <a:avLst/>
+          </a:prstGeom>
+          <a:noFill/>
+        </p:spPr>
+        <p:txBody>
+          <a:bodyPr wrap="square" rtlCol="0">
+            <a:spAutoFit/>
+          </a:bodyPr>
+          <a:lstStyle/>
+          <a:p>
+            <a:r>
+              <a:rPr lang="en-US" sz="1050" dirty="0" smtClean="0"/>
+              <a:t>reading is about 2.4 cm</a:t>
+            </a:r>
+            <a:endParaRPr lang="en-US" sz="1050" dirty="0"/>
+          </a:p>
+        </p:txBody>
+      </p:sp>
+      <p:cxnSp>
+        <p:nvCxnSpPr>
+          <p:cNvPr id="92" name="Straight Connector 91"/>
+          <p:cNvCxnSpPr/>
+          <p:nvPr/>
+        </p:nvCxnSpPr>
+        <p:spPr>
+          <a:xfrm flipH="1" flipV="1">
+            <a:off x="3071458" y="3300497"/>
+            <a:ext cx="0" cy="365760"/>
+          </a:xfrm>
+          <a:prstGeom prst="line">
+            <a:avLst/>
+          </a:prstGeom>
+          <a:ln>
+            <a:solidFill>
+              <a:schemeClr val="tx1"/>
+            </a:solidFill>
+            <a:tailEnd type="triangle" w="sm" len="med"/>
           </a:ln>
         </p:spPr>
         <p:style>

</xml_diff>